<commit_message>
Update ppt with new definitions. Add thumbs.db to gitignore.
</commit_message>
<xml_diff>
--- a/Project Documents/Group3_Presentation1_Capstone.pptx
+++ b/Project Documents/Group3_Presentation1_Capstone.pptx
@@ -29,9 +29,10 @@
     <p:sldId id="277" r:id="rId23"/>
     <p:sldId id="278" r:id="rId24"/>
     <p:sldId id="279" r:id="rId25"/>
-    <p:sldId id="280" r:id="rId26"/>
-    <p:sldId id="281" r:id="rId27"/>
-    <p:sldId id="282" r:id="rId28"/>
+    <p:sldId id="282" r:id="rId26"/>
+    <p:sldId id="283" r:id="rId27"/>
+    <p:sldId id="280" r:id="rId28"/>
+    <p:sldId id="281" r:id="rId29"/>
   </p:sldIdLst>
   <p:sldSz cx="9144000" cy="6858000" type="screen4x3"/>
   <p:notesSz cx="6858000" cy="9144000"/>
@@ -3870,7 +3871,7 @@
       </p:sp>
       <p:pic>
         <p:nvPicPr>
-          <p:cNvPr id="4" name="Picture 3"/>
+          <p:cNvPr id="3" name="Picture 2"/>
           <p:cNvPicPr>
             <a:picLocks noChangeAspect="1"/>
           </p:cNvPicPr>
@@ -3890,7 +3891,7 @@
         </p:blipFill>
         <p:spPr>
           <a:xfrm>
-            <a:off x="0" y="1219200"/>
+            <a:off x="0" y="1116169"/>
             <a:ext cx="9144000" cy="5468293"/>
           </a:xfrm>
           <a:prstGeom prst="rect">
@@ -7818,6 +7819,344 @@
         <p:spPr>
           <a:xfrm>
             <a:off x="457200" y="274638"/>
+            <a:ext cx="8001000" cy="1143000"/>
+          </a:xfrm>
+        </p:spPr>
+        <p:txBody>
+          <a:bodyPr>
+            <a:normAutofit fontScale="90000"/>
+          </a:bodyPr>
+          <a:lstStyle/>
+          <a:p>
+            <a:pPr algn="l"/>
+            <a:r>
+              <a:rPr lang="en-US" sz="6000" b="1" dirty="0" smtClean="0"/>
+              <a:t>Glossary of </a:t>
+            </a:r>
+            <a:r>
+              <a:rPr lang="en-US" sz="6000" b="1" dirty="0" smtClean="0"/>
+              <a:t>Terms (Entities)</a:t>
+            </a:r>
+            <a:endParaRPr lang="en-US" sz="6000" b="1" dirty="0"/>
+          </a:p>
+        </p:txBody>
+      </p:sp>
+      <p:sp>
+        <p:nvSpPr>
+          <p:cNvPr id="3" name="Content Placeholder 2"/>
+          <p:cNvSpPr>
+            <a:spLocks noGrp="1"/>
+          </p:cNvSpPr>
+          <p:nvPr>
+            <p:ph idx="1"/>
+          </p:nvPr>
+        </p:nvSpPr>
+        <p:spPr>
+          <a:xfrm>
+            <a:off x="457200" y="1600200"/>
+            <a:ext cx="8229600" cy="4953000"/>
+          </a:xfrm>
+        </p:spPr>
+        <p:txBody>
+          <a:bodyPr>
+            <a:normAutofit/>
+          </a:bodyPr>
+          <a:lstStyle/>
+          <a:p>
+            <a:r>
+              <a:rPr lang="en-US" sz="2000" b="1" dirty="0"/>
+              <a:t>Table</a:t>
+            </a:r>
+            <a:r>
+              <a:rPr lang="en-US" sz="2000" dirty="0"/>
+              <a:t>: The physical location at which Customers sit while dining.</a:t>
+            </a:r>
+          </a:p>
+          <a:p>
+            <a:r>
+              <a:rPr lang="en-US" sz="2000" b="1" dirty="0"/>
+              <a:t>Seat</a:t>
+            </a:r>
+            <a:r>
+              <a:rPr lang="en-US" sz="2000" dirty="0"/>
+              <a:t>: A single spot at a Table, identified by number. A Customer in a Party occupies a Seat.</a:t>
+            </a:r>
+          </a:p>
+          <a:p>
+            <a:r>
+              <a:rPr lang="en-US" sz="2000" b="1" dirty="0"/>
+              <a:t>Party</a:t>
+            </a:r>
+            <a:r>
+              <a:rPr lang="en-US" sz="2000" dirty="0"/>
+              <a:t>: A set of customers sitting together and ordering for the same meal.</a:t>
+            </a:r>
+          </a:p>
+          <a:p>
+            <a:r>
+              <a:rPr lang="en-US" sz="2000" b="1" dirty="0"/>
+              <a:t>Dish</a:t>
+            </a:r>
+            <a:r>
+              <a:rPr lang="en-US" sz="2000" dirty="0"/>
+              <a:t>: A dish or drink on the menu that a customer can order.</a:t>
+            </a:r>
+          </a:p>
+          <a:p>
+            <a:r>
+              <a:rPr lang="en-US" sz="2000" b="1" dirty="0"/>
+              <a:t>Dish Type</a:t>
+            </a:r>
+            <a:r>
+              <a:rPr lang="en-US" sz="2000" dirty="0"/>
+              <a:t>: An attribute of an item. Values include, Appetizer, Main, Dessert, Drink, etc.</a:t>
+            </a:r>
+          </a:p>
+          <a:p>
+            <a:r>
+              <a:rPr lang="en-US" sz="2000" b="1" dirty="0"/>
+              <a:t>Order</a:t>
+            </a:r>
+            <a:r>
+              <a:rPr lang="en-US" sz="2000" dirty="0"/>
+              <a:t>: A set of items ordered by a customer at a seat.</a:t>
+            </a:r>
+          </a:p>
+          <a:p>
+            <a:r>
+              <a:rPr lang="en-US" sz="2000" b="1" dirty="0"/>
+              <a:t>Order Group</a:t>
+            </a:r>
+            <a:r>
+              <a:rPr lang="en-US" sz="2000" dirty="0"/>
+              <a:t>: Orders to be paid by the same payee</a:t>
+            </a:r>
+            <a:r>
+              <a:rPr lang="en-US" sz="2000" dirty="0" smtClean="0"/>
+              <a:t>.</a:t>
+            </a:r>
+          </a:p>
+          <a:p>
+            <a:r>
+              <a:rPr lang="en-US" sz="2000" b="1" dirty="0"/>
+              <a:t>Bill</a:t>
+            </a:r>
+            <a:r>
+              <a:rPr lang="en-US" sz="2000" dirty="0"/>
+              <a:t>: All Dishes belonging to an Order Group. Includes the price of each Dish and the total price.</a:t>
+            </a:r>
+          </a:p>
+          <a:p>
+            <a:endParaRPr lang="en-US" sz="2000" dirty="0"/>
+          </a:p>
+        </p:txBody>
+      </p:sp>
+    </p:spTree>
+    <p:extLst>
+      <p:ext uri="{BB962C8B-B14F-4D97-AF65-F5344CB8AC3E}">
+        <p14:creationId xmlns:p14="http://schemas.microsoft.com/office/powerpoint/2010/main" val="1700301986"/>
+      </p:ext>
+    </p:extLst>
+  </p:cSld>
+  <p:clrMapOvr>
+    <a:masterClrMapping/>
+  </p:clrMapOvr>
+  <p:timing>
+    <p:tnLst>
+      <p:par>
+        <p:cTn id="1" dur="indefinite" restart="never" nodeType="tmRoot"/>
+      </p:par>
+    </p:tnLst>
+  </p:timing>
+</p:sld>
+</file>
+
+<file path=ppt/slides/slide26.xml><?xml version="1.0" encoding="utf-8"?>
+<p:sld xmlns:a="http://schemas.openxmlformats.org/drawingml/2006/main" xmlns:r="http://schemas.openxmlformats.org/officeDocument/2006/relationships" xmlns:p="http://schemas.openxmlformats.org/presentationml/2006/main">
+  <p:cSld>
+    <p:spTree>
+      <p:nvGrpSpPr>
+        <p:cNvPr id="1" name=""/>
+        <p:cNvGrpSpPr/>
+        <p:nvPr/>
+      </p:nvGrpSpPr>
+      <p:grpSpPr>
+        <a:xfrm>
+          <a:off x="0" y="0"/>
+          <a:ext cx="0" cy="0"/>
+          <a:chOff x="0" y="0"/>
+          <a:chExt cx="0" cy="0"/>
+        </a:xfrm>
+      </p:grpSpPr>
+      <p:sp>
+        <p:nvSpPr>
+          <p:cNvPr id="2" name="Title 1"/>
+          <p:cNvSpPr>
+            <a:spLocks noGrp="1"/>
+          </p:cNvSpPr>
+          <p:nvPr>
+            <p:ph type="title"/>
+          </p:nvPr>
+        </p:nvSpPr>
+        <p:spPr>
+          <a:xfrm>
+            <a:off x="457200" y="274638"/>
+            <a:ext cx="8001000" cy="1143000"/>
+          </a:xfrm>
+        </p:spPr>
+        <p:txBody>
+          <a:bodyPr>
+            <a:normAutofit fontScale="90000"/>
+          </a:bodyPr>
+          <a:lstStyle/>
+          <a:p>
+            <a:pPr algn="l"/>
+            <a:r>
+              <a:rPr lang="en-US" sz="6000" b="1" dirty="0"/>
+              <a:t>Glossary of Terms (Entities)</a:t>
+            </a:r>
+            <a:endParaRPr lang="en-US" sz="6000" b="1" dirty="0"/>
+          </a:p>
+        </p:txBody>
+      </p:sp>
+      <p:sp>
+        <p:nvSpPr>
+          <p:cNvPr id="3" name="Content Placeholder 2"/>
+          <p:cNvSpPr>
+            <a:spLocks noGrp="1"/>
+          </p:cNvSpPr>
+          <p:nvPr>
+            <p:ph idx="1"/>
+          </p:nvPr>
+        </p:nvSpPr>
+        <p:spPr>
+          <a:xfrm>
+            <a:off x="457200" y="1600200"/>
+            <a:ext cx="8229600" cy="4953000"/>
+          </a:xfrm>
+        </p:spPr>
+        <p:txBody>
+          <a:bodyPr>
+            <a:normAutofit/>
+          </a:bodyPr>
+          <a:lstStyle/>
+          <a:p>
+            <a:r>
+              <a:rPr lang="en-US" sz="2000" b="1" dirty="0" smtClean="0"/>
+              <a:t>Order </a:t>
+            </a:r>
+            <a:r>
+              <a:rPr lang="en-US" sz="2000" b="1" dirty="0"/>
+              <a:t>Queue</a:t>
+            </a:r>
+            <a:r>
+              <a:rPr lang="en-US" sz="2000" dirty="0"/>
+              <a:t>: List of Orders, used in the kitchen to plan for orders to be prepared on a first-come first-served basis (grouped by Party and Dish Type).</a:t>
+            </a:r>
+          </a:p>
+          <a:p>
+            <a:r>
+              <a:rPr lang="en-US" sz="2000" b="1" dirty="0"/>
+              <a:t>Item Queue</a:t>
+            </a:r>
+            <a:r>
+              <a:rPr lang="en-US" sz="2000" dirty="0"/>
+              <a:t>: List of Items, used in the kitchen to plan for Items of the same Type to be ready for each seat at a table at the same time.</a:t>
+            </a:r>
+          </a:p>
+          <a:p>
+            <a:r>
+              <a:rPr lang="en-US" sz="2000" b="1" dirty="0"/>
+              <a:t>Service Queue</a:t>
+            </a:r>
+            <a:r>
+              <a:rPr lang="en-US" sz="2000" dirty="0"/>
+              <a:t>: Collection of Items of the same type ready to be delivered to a table.</a:t>
+            </a:r>
+          </a:p>
+          <a:p>
+            <a:r>
+              <a:rPr lang="en-US" sz="2000" b="1" dirty="0"/>
+              <a:t>Bus queue</a:t>
+            </a:r>
+            <a:r>
+              <a:rPr lang="en-US" sz="2000" dirty="0"/>
+              <a:t>: List of tables ready to be cleaned and prepared for new customers.</a:t>
+            </a:r>
+          </a:p>
+          <a:p>
+            <a:r>
+              <a:rPr lang="en-US" sz="2000" b="1" dirty="0"/>
+              <a:t>Table status</a:t>
+            </a:r>
+            <a:r>
+              <a:rPr lang="en-US" sz="2000" dirty="0"/>
+              <a:t>: Attribute of Tables determining next action that can be taken. Values include: occupied, bus-queue, available.</a:t>
+            </a:r>
+          </a:p>
+          <a:p>
+            <a:r>
+              <a:rPr lang="en-US" sz="2000" b="1" dirty="0"/>
+              <a:t>Discount</a:t>
+            </a:r>
+            <a:r>
+              <a:rPr lang="en-US" sz="2000" dirty="0"/>
+              <a:t>: Any action that reduces prices below those listed in the menu. Includes coupons, complimentary items, manager adjustments.</a:t>
+            </a:r>
+            <a:endParaRPr lang="en-US" sz="2000" dirty="0"/>
+          </a:p>
+        </p:txBody>
+      </p:sp>
+    </p:spTree>
+    <p:extLst>
+      <p:ext uri="{BB962C8B-B14F-4D97-AF65-F5344CB8AC3E}">
+        <p14:creationId xmlns:p14="http://schemas.microsoft.com/office/powerpoint/2010/main" val="1399126867"/>
+      </p:ext>
+    </p:extLst>
+  </p:cSld>
+  <p:clrMapOvr>
+    <a:masterClrMapping/>
+  </p:clrMapOvr>
+  <p:timing>
+    <p:tnLst>
+      <p:par>
+        <p:cTn id="1" dur="indefinite" restart="never" nodeType="tmRoot"/>
+      </p:par>
+    </p:tnLst>
+  </p:timing>
+</p:sld>
+</file>
+
+<file path=ppt/slides/slide27.xml><?xml version="1.0" encoding="utf-8"?>
+<p:sld xmlns:a="http://schemas.openxmlformats.org/drawingml/2006/main" xmlns:r="http://schemas.openxmlformats.org/officeDocument/2006/relationships" xmlns:p="http://schemas.openxmlformats.org/presentationml/2006/main">
+  <p:cSld>
+    <p:spTree>
+      <p:nvGrpSpPr>
+        <p:cNvPr id="1" name=""/>
+        <p:cNvGrpSpPr/>
+        <p:nvPr/>
+      </p:nvGrpSpPr>
+      <p:grpSpPr>
+        <a:xfrm>
+          <a:off x="0" y="0"/>
+          <a:ext cx="0" cy="0"/>
+          <a:chOff x="0" y="0"/>
+          <a:chExt cx="0" cy="0"/>
+        </a:xfrm>
+      </p:grpSpPr>
+      <p:sp>
+        <p:nvSpPr>
+          <p:cNvPr id="2" name="Title 1"/>
+          <p:cNvSpPr>
+            <a:spLocks noGrp="1"/>
+          </p:cNvSpPr>
+          <p:nvPr>
+            <p:ph type="title"/>
+          </p:nvPr>
+        </p:nvSpPr>
+        <p:spPr>
+          <a:xfrm>
+            <a:off x="457200" y="274638"/>
             <a:ext cx="5486400" cy="1143000"/>
           </a:xfrm>
         </p:spPr>
@@ -7924,7 +8263,7 @@
 </p:sld>
 </file>
 
-<file path=ppt/slides/slide26.xml><?xml version="1.0" encoding="utf-8"?>
+<file path=ppt/slides/slide28.xml><?xml version="1.0" encoding="utf-8"?>
 <p:sld xmlns:a="http://schemas.openxmlformats.org/drawingml/2006/main" xmlns:r="http://schemas.openxmlformats.org/officeDocument/2006/relationships" xmlns:p="http://schemas.openxmlformats.org/presentationml/2006/main">
   <p:cSld>
     <p:spTree>
@@ -8553,222 +8892,6 @@
 </p:sld>
 </file>
 
-<file path=ppt/slides/slide27.xml><?xml version="1.0" encoding="utf-8"?>
-<p:sld xmlns:a="http://schemas.openxmlformats.org/drawingml/2006/main" xmlns:r="http://schemas.openxmlformats.org/officeDocument/2006/relationships" xmlns:p="http://schemas.openxmlformats.org/presentationml/2006/main">
-  <p:cSld>
-    <p:spTree>
-      <p:nvGrpSpPr>
-        <p:cNvPr id="1" name=""/>
-        <p:cNvGrpSpPr/>
-        <p:nvPr/>
-      </p:nvGrpSpPr>
-      <p:grpSpPr>
-        <a:xfrm>
-          <a:off x="0" y="0"/>
-          <a:ext cx="0" cy="0"/>
-          <a:chOff x="0" y="0"/>
-          <a:chExt cx="0" cy="0"/>
-        </a:xfrm>
-      </p:grpSpPr>
-      <p:sp>
-        <p:nvSpPr>
-          <p:cNvPr id="2" name="Title 1"/>
-          <p:cNvSpPr>
-            <a:spLocks noGrp="1"/>
-          </p:cNvSpPr>
-          <p:nvPr>
-            <p:ph type="title"/>
-          </p:nvPr>
-        </p:nvSpPr>
-        <p:spPr>
-          <a:xfrm>
-            <a:off x="457200" y="274638"/>
-            <a:ext cx="5486400" cy="1143000"/>
-          </a:xfrm>
-        </p:spPr>
-        <p:txBody>
-          <a:bodyPr>
-            <a:normAutofit fontScale="90000"/>
-          </a:bodyPr>
-          <a:lstStyle/>
-          <a:p>
-            <a:pPr algn="l"/>
-            <a:r>
-              <a:rPr lang="en-US" sz="6000" b="1" dirty="0" smtClean="0"/>
-              <a:t>Glossary of Terms</a:t>
-            </a:r>
-            <a:endParaRPr lang="en-US" sz="6000" b="1" dirty="0"/>
-          </a:p>
-        </p:txBody>
-      </p:sp>
-      <p:sp>
-        <p:nvSpPr>
-          <p:cNvPr id="3" name="Content Placeholder 2"/>
-          <p:cNvSpPr>
-            <a:spLocks noGrp="1"/>
-          </p:cNvSpPr>
-          <p:nvPr>
-            <p:ph idx="1"/>
-          </p:nvPr>
-        </p:nvSpPr>
-        <p:spPr>
-          <a:xfrm>
-            <a:off x="457200" y="1600200"/>
-            <a:ext cx="8229600" cy="4953000"/>
-          </a:xfrm>
-        </p:spPr>
-        <p:txBody>
-          <a:bodyPr>
-            <a:normAutofit fontScale="47500" lnSpcReduction="20000"/>
-          </a:bodyPr>
-          <a:lstStyle/>
-          <a:p>
-            <a:r>
-              <a:rPr lang="en-US" sz="4000" b="1" dirty="0"/>
-              <a:t>Table</a:t>
-            </a:r>
-            <a:r>
-              <a:rPr lang="en-US" sz="4000" dirty="0"/>
-              <a:t>: A set of customers sitting together and ordering for the same meal.</a:t>
-            </a:r>
-          </a:p>
-          <a:p>
-            <a:r>
-              <a:rPr lang="en-US" sz="4000" b="1" dirty="0"/>
-              <a:t>Seat</a:t>
-            </a:r>
-            <a:r>
-              <a:rPr lang="en-US" sz="4000" dirty="0"/>
-              <a:t>: A single person at a table, identified by number.</a:t>
-            </a:r>
-          </a:p>
-          <a:p>
-            <a:r>
-              <a:rPr lang="en-US" sz="4000" b="1" dirty="0"/>
-              <a:t>Item</a:t>
-            </a:r>
-            <a:r>
-              <a:rPr lang="en-US" sz="4000" dirty="0"/>
-              <a:t>: A dish or drink on the menu that a customer can order.</a:t>
-            </a:r>
-          </a:p>
-          <a:p>
-            <a:r>
-              <a:rPr lang="en-US" sz="4000" b="1" dirty="0"/>
-              <a:t>Item Type</a:t>
-            </a:r>
-            <a:r>
-              <a:rPr lang="en-US" sz="4000" dirty="0"/>
-              <a:t>: An attribute of an item. Values include, Appetizer, Main, Dessert, Drink, etc.</a:t>
-            </a:r>
-          </a:p>
-          <a:p>
-            <a:r>
-              <a:rPr lang="en-US" sz="4000" b="1" dirty="0"/>
-              <a:t>Order</a:t>
-            </a:r>
-            <a:r>
-              <a:rPr lang="en-US" sz="4000" dirty="0"/>
-              <a:t>: A set of items ordered by a customer at a seat.</a:t>
-            </a:r>
-          </a:p>
-          <a:p>
-            <a:r>
-              <a:rPr lang="en-US" sz="4000" b="1" dirty="0"/>
-              <a:t>Order Group</a:t>
-            </a:r>
-            <a:r>
-              <a:rPr lang="en-US" sz="4000" dirty="0"/>
-              <a:t>: Orders to be paid by the same payee.</a:t>
-            </a:r>
-          </a:p>
-          <a:p>
-            <a:r>
-              <a:rPr lang="en-US" sz="4000" b="1" dirty="0"/>
-              <a:t>Bill</a:t>
-            </a:r>
-            <a:r>
-              <a:rPr lang="en-US" sz="4000" dirty="0"/>
-              <a:t>: All Items belonging to a table, includes the price of each Item and the total price.</a:t>
-            </a:r>
-          </a:p>
-          <a:p>
-            <a:r>
-              <a:rPr lang="en-US" sz="4000" b="1" dirty="0"/>
-              <a:t>Order Queue</a:t>
-            </a:r>
-            <a:r>
-              <a:rPr lang="en-US" sz="4000" dirty="0"/>
-              <a:t>: List of Orders, used in the kitchen to plan for orders to be prepared on a first-come first-served basis (grouped by Bill).</a:t>
-            </a:r>
-          </a:p>
-          <a:p>
-            <a:r>
-              <a:rPr lang="en-US" sz="4000" b="1" dirty="0"/>
-              <a:t>Item Queue</a:t>
-            </a:r>
-            <a:r>
-              <a:rPr lang="en-US" sz="4000" dirty="0"/>
-              <a:t>: List of Items, used in the kitchen to plan for Items of the same Type to be ready for each seat at a table at the same time.</a:t>
-            </a:r>
-          </a:p>
-          <a:p>
-            <a:r>
-              <a:rPr lang="en-US" sz="4000" b="1" dirty="0"/>
-              <a:t>Service Queue</a:t>
-            </a:r>
-            <a:r>
-              <a:rPr lang="en-US" sz="4000" dirty="0"/>
-              <a:t>: Collection of Items of the same type ready to be delivered to a table.</a:t>
-            </a:r>
-          </a:p>
-          <a:p>
-            <a:r>
-              <a:rPr lang="en-US" sz="4000" b="1" dirty="0"/>
-              <a:t>Bus queue</a:t>
-            </a:r>
-            <a:r>
-              <a:rPr lang="en-US" sz="4000" dirty="0"/>
-              <a:t>: List of tables ready to be cleaned and prepared for new customers.</a:t>
-            </a:r>
-          </a:p>
-          <a:p>
-            <a:r>
-              <a:rPr lang="en-US" sz="4000" b="1" dirty="0"/>
-              <a:t>Table status</a:t>
-            </a:r>
-            <a:r>
-              <a:rPr lang="en-US" sz="4000" dirty="0"/>
-              <a:t>: Attribute of Tables determining next action that can be taken. Values include: occupied, bus-queue, available</a:t>
-            </a:r>
-            <a:r>
-              <a:rPr lang="en-US" sz="4000" dirty="0" smtClean="0"/>
-              <a:t>.</a:t>
-            </a:r>
-            <a:endParaRPr lang="en-US" sz="4000" dirty="0"/>
-          </a:p>
-        </p:txBody>
-      </p:sp>
-    </p:spTree>
-    <p:extLst>
-      <p:ext uri="{BB962C8B-B14F-4D97-AF65-F5344CB8AC3E}">
-        <p14:creationId xmlns:p14="http://schemas.microsoft.com/office/powerpoint/2010/main" val="1700301986"/>
-      </p:ext>
-    </p:extLst>
-  </p:cSld>
-  <p:clrMapOvr>
-    <a:masterClrMapping/>
-  </p:clrMapOvr>
-  <p:timing>
-    <p:tnLst>
-      <p:par>
-        <p:cTn id="1" dur="indefinite" restart="never" nodeType="tmRoot"/>
-      </p:par>
-    </p:tnLst>
-  </p:timing>
-</p:sld>
-</file>
-
 <file path=ppt/slides/slide3.xml><?xml version="1.0" encoding="utf-8"?>
 <p:sld xmlns:a="http://schemas.openxmlformats.org/drawingml/2006/main" xmlns:r="http://schemas.openxmlformats.org/officeDocument/2006/relationships" xmlns:p="http://schemas.openxmlformats.org/presentationml/2006/main">
   <p:cSld>
@@ -8786,28 +8909,6 @@
           <a:chExt cx="0" cy="0"/>
         </a:xfrm>
       </p:grpSpPr>
-      <p:sp>
-        <p:nvSpPr>
-          <p:cNvPr id="2" name="Title 1"/>
-          <p:cNvSpPr>
-            <a:spLocks noGrp="1"/>
-          </p:cNvSpPr>
-          <p:nvPr>
-            <p:ph type="title"/>
-          </p:nvPr>
-        </p:nvSpPr>
-        <p:spPr/>
-        <p:txBody>
-          <a:bodyPr>
-            <a:normAutofit/>
-          </a:bodyPr>
-          <a:lstStyle/>
-          <a:p>
-            <a:pPr algn="l"/>
-            <a:endParaRPr lang="en-US" sz="6000" b="1" dirty="0"/>
-          </a:p>
-        </p:txBody>
-      </p:sp>
       <p:pic>
         <p:nvPicPr>
           <p:cNvPr id="4" name="Content Placeholder 3"/>
@@ -9316,9 +9417,103 @@
           </a:p>
         </p:txBody>
       </p:sp>
+      <p:sp>
+        <p:nvSpPr>
+          <p:cNvPr id="5" name="TextBox 4"/>
+          <p:cNvSpPr txBox="1"/>
+          <p:nvPr/>
+        </p:nvSpPr>
+        <p:spPr>
+          <a:xfrm>
+            <a:off x="304800" y="1371600"/>
+            <a:ext cx="2514600" cy="4524315"/>
+          </a:xfrm>
+          <a:prstGeom prst="rect">
+            <a:avLst/>
+          </a:prstGeom>
+          <a:noFill/>
+        </p:spPr>
+        <p:txBody>
+          <a:bodyPr wrap="square" rtlCol="0">
+            <a:spAutoFit/>
+          </a:bodyPr>
+          <a:lstStyle/>
+          <a:p>
+            <a:pPr marL="285750" indent="-285750">
+              <a:buFont typeface="Arial" panose="020B0604020202020204" pitchFamily="34" charset="0"/>
+              <a:buChar char="•"/>
+            </a:pPr>
+            <a:r>
+              <a:rPr lang="en-US" sz="3600" dirty="0" smtClean="0"/>
+              <a:t>Waiter</a:t>
+            </a:r>
+          </a:p>
+          <a:p>
+            <a:pPr marL="285750" indent="-285750">
+              <a:buFont typeface="Arial" panose="020B0604020202020204" pitchFamily="34" charset="0"/>
+              <a:buChar char="•"/>
+            </a:pPr>
+            <a:r>
+              <a:rPr lang="en-US" sz="3600" dirty="0" smtClean="0"/>
+              <a:t>Kitchen Staff</a:t>
+            </a:r>
+          </a:p>
+          <a:p>
+            <a:pPr marL="285750" indent="-285750">
+              <a:buFont typeface="Arial" panose="020B0604020202020204" pitchFamily="34" charset="0"/>
+              <a:buChar char="•"/>
+            </a:pPr>
+            <a:r>
+              <a:rPr lang="en-US" sz="3600" dirty="0" smtClean="0"/>
+              <a:t>Hostess</a:t>
+            </a:r>
+          </a:p>
+          <a:p>
+            <a:pPr marL="285750" indent="-285750">
+              <a:buFont typeface="Arial" panose="020B0604020202020204" pitchFamily="34" charset="0"/>
+              <a:buChar char="•"/>
+            </a:pPr>
+            <a:r>
+              <a:rPr lang="en-US" sz="3600" dirty="0" smtClean="0"/>
+              <a:t>Customer</a:t>
+            </a:r>
+          </a:p>
+          <a:p>
+            <a:pPr marL="285750" indent="-285750">
+              <a:buFont typeface="Arial" panose="020B0604020202020204" pitchFamily="34" charset="0"/>
+              <a:buChar char="•"/>
+            </a:pPr>
+            <a:r>
+              <a:rPr lang="en-US" sz="3600" dirty="0" smtClean="0"/>
+              <a:t>Busboy</a:t>
+            </a:r>
+          </a:p>
+          <a:p>
+            <a:pPr marL="285750" indent="-285750">
+              <a:buFont typeface="Arial" panose="020B0604020202020204" pitchFamily="34" charset="0"/>
+              <a:buChar char="•"/>
+            </a:pPr>
+            <a:r>
+              <a:rPr lang="en-US" sz="3600" dirty="0" smtClean="0"/>
+              <a:t>Bartender</a:t>
+            </a:r>
+          </a:p>
+          <a:p>
+            <a:pPr marL="285750" indent="-285750">
+              <a:buFont typeface="Arial" panose="020B0604020202020204" pitchFamily="34" charset="0"/>
+              <a:buChar char="•"/>
+            </a:pPr>
+            <a:r>
+              <a:rPr lang="en-US" sz="3600" dirty="0" smtClean="0"/>
+              <a:t>Manager</a:t>
+            </a:r>
+            <a:endParaRPr lang="en-US" sz="3600" dirty="0"/>
+          </a:p>
+        </p:txBody>
+      </p:sp>
       <p:pic>
         <p:nvPicPr>
-          <p:cNvPr id="3" name="Picture 2"/>
+          <p:cNvPr id="4" name="Picture 3"/>
           <p:cNvPicPr>
             <a:picLocks noChangeAspect="1"/>
           </p:cNvPicPr>
@@ -9338,108 +9533,14 @@
         </p:blipFill>
         <p:spPr>
           <a:xfrm>
-            <a:off x="3048000" y="1249362"/>
-            <a:ext cx="5809524" cy="5333333"/>
+            <a:off x="3505200" y="1249362"/>
+            <a:ext cx="5239481" cy="5048955"/>
           </a:xfrm>
           <a:prstGeom prst="rect">
             <a:avLst/>
           </a:prstGeom>
         </p:spPr>
       </p:pic>
-      <p:sp>
-        <p:nvSpPr>
-          <p:cNvPr id="5" name="TextBox 4"/>
-          <p:cNvSpPr txBox="1"/>
-          <p:nvPr/>
-        </p:nvSpPr>
-        <p:spPr>
-          <a:xfrm>
-            <a:off x="304800" y="1371600"/>
-            <a:ext cx="2514600" cy="4524315"/>
-          </a:xfrm>
-          <a:prstGeom prst="rect">
-            <a:avLst/>
-          </a:prstGeom>
-          <a:noFill/>
-        </p:spPr>
-        <p:txBody>
-          <a:bodyPr wrap="square" rtlCol="0">
-            <a:spAutoFit/>
-          </a:bodyPr>
-          <a:lstStyle/>
-          <a:p>
-            <a:pPr marL="285750" indent="-285750">
-              <a:buFont typeface="Arial" panose="020B0604020202020204" pitchFamily="34" charset="0"/>
-              <a:buChar char="•"/>
-            </a:pPr>
-            <a:r>
-              <a:rPr lang="en-US" sz="3600" dirty="0" smtClean="0"/>
-              <a:t>Waiter</a:t>
-            </a:r>
-          </a:p>
-          <a:p>
-            <a:pPr marL="285750" indent="-285750">
-              <a:buFont typeface="Arial" panose="020B0604020202020204" pitchFamily="34" charset="0"/>
-              <a:buChar char="•"/>
-            </a:pPr>
-            <a:r>
-              <a:rPr lang="en-US" sz="3600" dirty="0" smtClean="0"/>
-              <a:t>Kitchen Staff</a:t>
-            </a:r>
-          </a:p>
-          <a:p>
-            <a:pPr marL="285750" indent="-285750">
-              <a:buFont typeface="Arial" panose="020B0604020202020204" pitchFamily="34" charset="0"/>
-              <a:buChar char="•"/>
-            </a:pPr>
-            <a:r>
-              <a:rPr lang="en-US" sz="3600" dirty="0" smtClean="0"/>
-              <a:t>Hostess</a:t>
-            </a:r>
-          </a:p>
-          <a:p>
-            <a:pPr marL="285750" indent="-285750">
-              <a:buFont typeface="Arial" panose="020B0604020202020204" pitchFamily="34" charset="0"/>
-              <a:buChar char="•"/>
-            </a:pPr>
-            <a:r>
-              <a:rPr lang="en-US" sz="3600" dirty="0" smtClean="0"/>
-              <a:t>Customer</a:t>
-            </a:r>
-          </a:p>
-          <a:p>
-            <a:pPr marL="285750" indent="-285750">
-              <a:buFont typeface="Arial" panose="020B0604020202020204" pitchFamily="34" charset="0"/>
-              <a:buChar char="•"/>
-            </a:pPr>
-            <a:r>
-              <a:rPr lang="en-US" sz="3600" dirty="0" smtClean="0"/>
-              <a:t>Busboy</a:t>
-            </a:r>
-          </a:p>
-          <a:p>
-            <a:pPr marL="285750" indent="-285750">
-              <a:buFont typeface="Arial" panose="020B0604020202020204" pitchFamily="34" charset="0"/>
-              <a:buChar char="•"/>
-            </a:pPr>
-            <a:r>
-              <a:rPr lang="en-US" sz="3600" dirty="0" smtClean="0"/>
-              <a:t>Bartender</a:t>
-            </a:r>
-          </a:p>
-          <a:p>
-            <a:pPr marL="285750" indent="-285750">
-              <a:buFont typeface="Arial" panose="020B0604020202020204" pitchFamily="34" charset="0"/>
-              <a:buChar char="•"/>
-            </a:pPr>
-            <a:r>
-              <a:rPr lang="en-US" sz="3600" dirty="0" smtClean="0"/>
-              <a:t>Manager</a:t>
-            </a:r>
-            <a:endParaRPr lang="en-US" sz="3600" dirty="0"/>
-          </a:p>
-        </p:txBody>
-      </p:sp>
     </p:spTree>
     <p:extLst>
       <p:ext uri="{BB962C8B-B14F-4D97-AF65-F5344CB8AC3E}">

</xml_diff>

<commit_message>
Updated DM in all docs
In DM: Fixed Capitalization, Added Item Queue, Service Queue, Matched
terms to those in the Report Glossary.
In Report: Updated Domain Model Diagram, removed "Adding deleting and
confirming reservations" from page 17 as it was crossed out
In Powerpoint: Removed Main Success Senario Slides as they were replaced
by the Basic Idea Slides, Updated Domain Model
</commit_message>
<xml_diff>
--- a/Project Documents/Group3_Presentation1_Capstone.pptx
+++ b/Project Documents/Group3_Presentation1_Capstone.pptx
@@ -130,7 +130,7 @@
   </p:defaultTextStyle>
   <p:extLst>
     <p:ext uri="{EFAFB233-063F-42B5-8137-9DF3F51BA10A}">
-      <p15:sldGuideLst xmlns:p15="http://schemas.microsoft.com/office/powerpoint/2012/main" xmlns="">
+      <p15:sldGuideLst xmlns="" xmlns:p15="http://schemas.microsoft.com/office/powerpoint/2012/main">
         <p15:guide id="1" orient="horz" pos="2160">
           <p15:clr>
             <a:srgbClr val="A4A3A4"/>
@@ -3709,8 +3709,8 @@
         </p:blipFill>
         <p:spPr>
           <a:xfrm>
-            <a:off x="0" y="1219200"/>
-            <a:ext cx="9144000" cy="5468292"/>
+            <a:off x="1" y="1219200"/>
+            <a:ext cx="9143998" cy="5468292"/>
           </a:xfrm>
           <a:prstGeom prst="rect">
             <a:avLst/>

</xml_diff>